<commit_message>
Edited version of proposal
</commit_message>
<xml_diff>
--- a/FYP/FYPTimeline 6th June Edition.pptx
+++ b/FYP/FYPTimeline 6th June Edition.pptx
@@ -5,10 +5,11 @@
     <p:sldMasterId id="2147483660" r:id="rId1"/>
   </p:sldMasterIdLst>
   <p:notesMasterIdLst>
-    <p:notesMasterId r:id="rId3"/>
+    <p:notesMasterId r:id="rId4"/>
   </p:notesMasterIdLst>
   <p:sldIdLst>
     <p:sldId id="256" r:id="rId2"/>
+    <p:sldId id="257" r:id="rId3"/>
   </p:sldIdLst>
   <p:sldSz cx="12801600" cy="9601200" type="A3"/>
   <p:notesSz cx="6858000" cy="9144000"/>
@@ -208,7 +209,7 @@
           <a:p>
             <a:fld id="{D8A5F3BE-A6C5-E54D-9A35-A968F4ADF59A}" type="datetimeFigureOut">
               <a:rPr lang="en-US" smtClean="0"/>
-              <a:t>6/5/2016</a:t>
+              <a:t>6/6/16</a:t>
             </a:fld>
             <a:endParaRPr lang="en-US"/>
           </a:p>
@@ -696,7 +697,7 @@
           <a:p>
             <a:fld id="{D93CE7DB-6B87-9F48-AC89-27FF703009F0}" type="datetimeFigureOut">
               <a:rPr lang="en-US" smtClean="0"/>
-              <a:t>6/5/2016</a:t>
+              <a:t>6/6/16</a:t>
             </a:fld>
             <a:endParaRPr lang="en-US"/>
           </a:p>
@@ -866,7 +867,7 @@
           <a:p>
             <a:fld id="{D93CE7DB-6B87-9F48-AC89-27FF703009F0}" type="datetimeFigureOut">
               <a:rPr lang="en-US" smtClean="0"/>
-              <a:t>6/5/2016</a:t>
+              <a:t>6/6/16</a:t>
             </a:fld>
             <a:endParaRPr lang="en-US"/>
           </a:p>
@@ -1046,7 +1047,7 @@
           <a:p>
             <a:fld id="{D93CE7DB-6B87-9F48-AC89-27FF703009F0}" type="datetimeFigureOut">
               <a:rPr lang="en-US" smtClean="0"/>
-              <a:t>6/5/2016</a:t>
+              <a:t>6/6/16</a:t>
             </a:fld>
             <a:endParaRPr lang="en-US"/>
           </a:p>
@@ -1216,7 +1217,7 @@
           <a:p>
             <a:fld id="{D93CE7DB-6B87-9F48-AC89-27FF703009F0}" type="datetimeFigureOut">
               <a:rPr lang="en-US" smtClean="0"/>
-              <a:t>6/5/2016</a:t>
+              <a:t>6/6/16</a:t>
             </a:fld>
             <a:endParaRPr lang="en-US"/>
           </a:p>
@@ -1460,7 +1461,7 @@
           <a:p>
             <a:fld id="{D93CE7DB-6B87-9F48-AC89-27FF703009F0}" type="datetimeFigureOut">
               <a:rPr lang="en-US" smtClean="0"/>
-              <a:t>6/5/2016</a:t>
+              <a:t>6/6/16</a:t>
             </a:fld>
             <a:endParaRPr lang="en-US"/>
           </a:p>
@@ -1692,7 +1693,7 @@
           <a:p>
             <a:fld id="{D93CE7DB-6B87-9F48-AC89-27FF703009F0}" type="datetimeFigureOut">
               <a:rPr lang="en-US" smtClean="0"/>
-              <a:t>6/5/2016</a:t>
+              <a:t>6/6/16</a:t>
             </a:fld>
             <a:endParaRPr lang="en-US"/>
           </a:p>
@@ -2059,7 +2060,7 @@
           <a:p>
             <a:fld id="{D93CE7DB-6B87-9F48-AC89-27FF703009F0}" type="datetimeFigureOut">
               <a:rPr lang="en-US" smtClean="0"/>
-              <a:t>6/5/2016</a:t>
+              <a:t>6/6/16</a:t>
             </a:fld>
             <a:endParaRPr lang="en-US"/>
           </a:p>
@@ -2177,7 +2178,7 @@
           <a:p>
             <a:fld id="{D93CE7DB-6B87-9F48-AC89-27FF703009F0}" type="datetimeFigureOut">
               <a:rPr lang="en-US" smtClean="0"/>
-              <a:t>6/5/2016</a:t>
+              <a:t>6/6/16</a:t>
             </a:fld>
             <a:endParaRPr lang="en-US"/>
           </a:p>
@@ -2272,7 +2273,7 @@
           <a:p>
             <a:fld id="{D93CE7DB-6B87-9F48-AC89-27FF703009F0}" type="datetimeFigureOut">
               <a:rPr lang="en-US" smtClean="0"/>
-              <a:t>6/5/2016</a:t>
+              <a:t>6/6/16</a:t>
             </a:fld>
             <a:endParaRPr lang="en-US"/>
           </a:p>
@@ -2549,7 +2550,7 @@
           <a:p>
             <a:fld id="{D93CE7DB-6B87-9F48-AC89-27FF703009F0}" type="datetimeFigureOut">
               <a:rPr lang="en-US" smtClean="0"/>
-              <a:t>6/5/2016</a:t>
+              <a:t>6/6/16</a:t>
             </a:fld>
             <a:endParaRPr lang="en-US"/>
           </a:p>
@@ -2806,7 +2807,7 @@
           <a:p>
             <a:fld id="{D93CE7DB-6B87-9F48-AC89-27FF703009F0}" type="datetimeFigureOut">
               <a:rPr lang="en-US" smtClean="0"/>
-              <a:t>6/5/2016</a:t>
+              <a:t>6/6/16</a:t>
             </a:fld>
             <a:endParaRPr lang="en-US"/>
           </a:p>
@@ -3019,7 +3020,7 @@
           <a:p>
             <a:fld id="{D93CE7DB-6B87-9F48-AC89-27FF703009F0}" type="datetimeFigureOut">
               <a:rPr lang="en-US" smtClean="0"/>
-              <a:t>6/5/2016</a:t>
+              <a:t>6/6/16</a:t>
             </a:fld>
             <a:endParaRPr lang="en-US"/>
           </a:p>
@@ -3424,56 +3425,6 @@
           <a:chExt cx="0" cy="0"/>
         </a:xfrm>
       </p:grpSpPr>
-      <p:sp>
-        <p:nvSpPr>
-          <p:cNvPr id="89" name="Rectangle 88"/>
-          <p:cNvSpPr/>
-          <p:nvPr/>
-        </p:nvSpPr>
-        <p:spPr>
-          <a:xfrm>
-            <a:off x="6912103" y="151075"/>
-            <a:ext cx="1806426" cy="1542553"/>
-          </a:xfrm>
-          <a:prstGeom prst="rect">
-            <a:avLst/>
-          </a:prstGeom>
-          <a:solidFill>
-            <a:srgbClr val="E7E7E7"/>
-          </a:solidFill>
-          <a:ln>
-            <a:solidFill>
-              <a:schemeClr val="accent6">
-                <a:lumMod val="50000"/>
-              </a:schemeClr>
-            </a:solidFill>
-          </a:ln>
-        </p:spPr>
-        <p:style>
-          <a:lnRef idx="2">
-            <a:schemeClr val="accent1">
-              <a:shade val="50000"/>
-            </a:schemeClr>
-          </a:lnRef>
-          <a:fillRef idx="1">
-            <a:schemeClr val="accent1"/>
-          </a:fillRef>
-          <a:effectRef idx="0">
-            <a:schemeClr val="accent1"/>
-          </a:effectRef>
-          <a:fontRef idx="minor">
-            <a:schemeClr val="lt1"/>
-          </a:fontRef>
-        </p:style>
-        <p:txBody>
-          <a:bodyPr rtlCol="0" anchor="ctr"/>
-          <a:lstStyle/>
-          <a:p>
-            <a:pPr algn="ctr"/>
-            <a:endParaRPr lang="en-SG"/>
-          </a:p>
-        </p:txBody>
-      </p:sp>
       <p:cxnSp>
         <p:nvCxnSpPr>
           <p:cNvPr id="5" name="Straight Connector 4"/>
@@ -5145,7 +5096,7 @@
                 <a:gridCol w="1612468">
                   <a:extLst>
                     <a:ext uri="{9D8B030D-6E8A-4147-A177-3AD203B41FA5}">
-                      <a16:colId xmlns:a16="http://schemas.microsoft.com/office/drawing/2014/main" val="20000"/>
+                      <a16:colId xmlns:a16="http://schemas.microsoft.com/office/drawing/2014/main" xmlns="" val="20000"/>
                     </a:ext>
                   </a:extLst>
                 </a:gridCol>
@@ -5220,7 +5171,7 @@
                 </a:tc>
                 <a:extLst>
                   <a:ext uri="{0D108BD9-81ED-4DB2-BD59-A6C34878D82A}">
-                    <a16:rowId xmlns:a16="http://schemas.microsoft.com/office/drawing/2014/main" val="10000"/>
+                    <a16:rowId xmlns:a16="http://schemas.microsoft.com/office/drawing/2014/main" xmlns="" val="10000"/>
                   </a:ext>
                 </a:extLst>
               </a:tr>
@@ -5254,7 +5205,7 @@
                 </a:tc>
                 <a:extLst>
                   <a:ext uri="{0D108BD9-81ED-4DB2-BD59-A6C34878D82A}">
-                    <a16:rowId xmlns:a16="http://schemas.microsoft.com/office/drawing/2014/main" val="10001"/>
+                    <a16:rowId xmlns:a16="http://schemas.microsoft.com/office/drawing/2014/main" xmlns="" val="10001"/>
                   </a:ext>
                 </a:extLst>
               </a:tr>
@@ -5296,7 +5247,7 @@
                 </a:tc>
                 <a:extLst>
                   <a:ext uri="{0D108BD9-81ED-4DB2-BD59-A6C34878D82A}">
-                    <a16:rowId xmlns:a16="http://schemas.microsoft.com/office/drawing/2014/main" val="10002"/>
+                    <a16:rowId xmlns:a16="http://schemas.microsoft.com/office/drawing/2014/main" xmlns="" val="10002"/>
                   </a:ext>
                 </a:extLst>
               </a:tr>
@@ -5330,7 +5281,7 @@
                 </a:tc>
                 <a:extLst>
                   <a:ext uri="{0D108BD9-81ED-4DB2-BD59-A6C34878D82A}">
-                    <a16:rowId xmlns:a16="http://schemas.microsoft.com/office/drawing/2014/main" val="10003"/>
+                    <a16:rowId xmlns:a16="http://schemas.microsoft.com/office/drawing/2014/main" xmlns="" val="10003"/>
                   </a:ext>
                 </a:extLst>
               </a:tr>
@@ -5338,272 +5289,6 @@
           </a:graphicData>
         </a:graphic>
       </p:graphicFrame>
-      <p:sp>
-        <p:nvSpPr>
-          <p:cNvPr id="57" name="Oval 56"/>
-          <p:cNvSpPr/>
-          <p:nvPr/>
-        </p:nvSpPr>
-        <p:spPr>
-          <a:xfrm>
-            <a:off x="6993390" y="270300"/>
-            <a:ext cx="270614" cy="268395"/>
-          </a:xfrm>
-          <a:prstGeom prst="ellipse">
-            <a:avLst/>
-          </a:prstGeom>
-          <a:solidFill>
-            <a:srgbClr val="BDC3C7"/>
-          </a:solidFill>
-          <a:ln>
-            <a:solidFill>
-              <a:schemeClr val="bg2">
-                <a:lumMod val="75000"/>
-              </a:schemeClr>
-            </a:solidFill>
-          </a:ln>
-        </p:spPr>
-        <p:style>
-          <a:lnRef idx="2">
-            <a:schemeClr val="accent1">
-              <a:shade val="50000"/>
-            </a:schemeClr>
-          </a:lnRef>
-          <a:fillRef idx="1">
-            <a:schemeClr val="accent1"/>
-          </a:fillRef>
-          <a:effectRef idx="0">
-            <a:schemeClr val="accent1"/>
-          </a:effectRef>
-          <a:fontRef idx="minor">
-            <a:schemeClr val="lt1"/>
-          </a:fontRef>
-        </p:style>
-        <p:txBody>
-          <a:bodyPr rtlCol="0" anchor="ctr"/>
-          <a:lstStyle/>
-          <a:p>
-            <a:pPr algn="ctr"/>
-            <a:endParaRPr lang="en-US" sz="1471" dirty="0">
-              <a:latin typeface="Noveo Sans" charset="0"/>
-              <a:ea typeface="Noveo Sans" charset="0"/>
-              <a:cs typeface="Noveo Sans" charset="0"/>
-            </a:endParaRPr>
-          </a:p>
-        </p:txBody>
-      </p:sp>
-      <p:sp>
-        <p:nvSpPr>
-          <p:cNvPr id="59" name="TextBox 58"/>
-          <p:cNvSpPr txBox="1"/>
-          <p:nvPr/>
-        </p:nvSpPr>
-        <p:spPr>
-          <a:xfrm>
-            <a:off x="7234354" y="262848"/>
-            <a:ext cx="2136001" cy="286232"/>
-          </a:xfrm>
-          <a:prstGeom prst="rect">
-            <a:avLst/>
-          </a:prstGeom>
-          <a:noFill/>
-        </p:spPr>
-        <p:txBody>
-          <a:bodyPr wrap="square" rtlCol="0">
-            <a:spAutoFit/>
-          </a:bodyPr>
-          <a:lstStyle/>
-          <a:p>
-            <a:r>
-              <a:rPr lang="en-US" sz="1260" dirty="0">
-                <a:latin typeface="Noveo Sans" charset="0"/>
-                <a:ea typeface="Noveo Sans" charset="0"/>
-                <a:cs typeface="Noveo Sans" charset="0"/>
-              </a:rPr>
-              <a:t>= Iteration Number</a:t>
-            </a:r>
-          </a:p>
-        </p:txBody>
-      </p:sp>
-      <p:sp>
-        <p:nvSpPr>
-          <p:cNvPr id="60" name="Rectangle 59"/>
-          <p:cNvSpPr/>
-          <p:nvPr/>
-        </p:nvSpPr>
-        <p:spPr>
-          <a:xfrm>
-            <a:off x="6993389" y="574372"/>
-            <a:ext cx="1190833" cy="211687"/>
-          </a:xfrm>
-          <a:prstGeom prst="rect">
-            <a:avLst/>
-          </a:prstGeom>
-          <a:solidFill>
-            <a:srgbClr val="FDB813"/>
-          </a:solidFill>
-          <a:ln>
-            <a:noFill/>
-          </a:ln>
-        </p:spPr>
-        <p:style>
-          <a:lnRef idx="2">
-            <a:schemeClr val="accent1">
-              <a:shade val="50000"/>
-            </a:schemeClr>
-          </a:lnRef>
-          <a:fillRef idx="1">
-            <a:schemeClr val="accent1"/>
-          </a:fillRef>
-          <a:effectRef idx="0">
-            <a:schemeClr val="accent1"/>
-          </a:effectRef>
-          <a:fontRef idx="minor">
-            <a:schemeClr val="lt1"/>
-          </a:fontRef>
-        </p:style>
-        <p:txBody>
-          <a:bodyPr rot="0" spcFirstLastPara="0" vertOverflow="overflow" horzOverflow="overflow" vert="horz" wrap="square" lIns="96012" tIns="48007" rIns="96012" bIns="48007" numCol="1" spcCol="0" rtlCol="0" fromWordArt="0" anchor="ctr" anchorCtr="0" forceAA="0" compatLnSpc="1">
-            <a:prstTxWarp prst="textNoShape">
-              <a:avLst/>
-            </a:prstTxWarp>
-            <a:noAutofit/>
-          </a:bodyPr>
-          <a:lstStyle/>
-          <a:p>
-            <a:pPr algn="ctr"/>
-            <a:r>
-              <a:rPr lang="en-US" sz="1680" dirty="0">
-                <a:latin typeface="Noveo Sans" charset="0"/>
-                <a:ea typeface="Noveo Sans" charset="0"/>
-                <a:cs typeface="Noveo Sans" charset="0"/>
-              </a:rPr>
-              <a:t>User Test</a:t>
-            </a:r>
-          </a:p>
-        </p:txBody>
-      </p:sp>
-      <p:sp>
-        <p:nvSpPr>
-          <p:cNvPr id="61" name="Rectangle 60"/>
-          <p:cNvSpPr/>
-          <p:nvPr/>
-        </p:nvSpPr>
-        <p:spPr>
-          <a:xfrm>
-            <a:off x="6993390" y="821418"/>
-            <a:ext cx="1190833" cy="237239"/>
-          </a:xfrm>
-          <a:prstGeom prst="rect">
-            <a:avLst/>
-          </a:prstGeom>
-          <a:solidFill>
-            <a:srgbClr val="DE1A54"/>
-          </a:solidFill>
-          <a:ln>
-            <a:noFill/>
-          </a:ln>
-        </p:spPr>
-        <p:style>
-          <a:lnRef idx="2">
-            <a:schemeClr val="accent1">
-              <a:shade val="50000"/>
-            </a:schemeClr>
-          </a:lnRef>
-          <a:fillRef idx="1">
-            <a:schemeClr val="accent1"/>
-          </a:fillRef>
-          <a:effectRef idx="0">
-            <a:schemeClr val="accent1"/>
-          </a:effectRef>
-          <a:fontRef idx="minor">
-            <a:schemeClr val="lt1"/>
-          </a:fontRef>
-        </p:style>
-        <p:txBody>
-          <a:bodyPr rot="0" spcFirstLastPara="0" vertOverflow="overflow" horzOverflow="overflow" vert="horz" wrap="square" lIns="96012" tIns="48007" rIns="96012" bIns="48007" numCol="1" spcCol="0" rtlCol="0" fromWordArt="0" anchor="ctr" anchorCtr="0" forceAA="0" compatLnSpc="1">
-            <a:prstTxWarp prst="textNoShape">
-              <a:avLst/>
-            </a:prstTxWarp>
-            <a:noAutofit/>
-          </a:bodyPr>
-          <a:lstStyle/>
-          <a:p>
-            <a:pPr algn="ctr"/>
-            <a:r>
-              <a:rPr lang="en-US" sz="1680" dirty="0">
-                <a:latin typeface="Noveo Sans" charset="0"/>
-                <a:ea typeface="Noveo Sans" charset="0"/>
-                <a:cs typeface="Noveo Sans" charset="0"/>
-              </a:rPr>
-              <a:t>Milestones</a:t>
-            </a:r>
-          </a:p>
-        </p:txBody>
-      </p:sp>
-      <p:sp>
-        <p:nvSpPr>
-          <p:cNvPr id="62" name="Rectangle 61"/>
-          <p:cNvSpPr/>
-          <p:nvPr/>
-        </p:nvSpPr>
-        <p:spPr>
-          <a:xfrm>
-            <a:off x="6993390" y="1107988"/>
-            <a:ext cx="1190833" cy="489739"/>
-          </a:xfrm>
-          <a:prstGeom prst="rect">
-            <a:avLst/>
-          </a:prstGeom>
-          <a:solidFill>
-            <a:srgbClr val="0068B3"/>
-          </a:solidFill>
-          <a:ln>
-            <a:noFill/>
-          </a:ln>
-        </p:spPr>
-        <p:style>
-          <a:lnRef idx="2">
-            <a:schemeClr val="accent1">
-              <a:shade val="50000"/>
-            </a:schemeClr>
-          </a:lnRef>
-          <a:fillRef idx="1">
-            <a:schemeClr val="accent1"/>
-          </a:fillRef>
-          <a:effectRef idx="0">
-            <a:schemeClr val="accent1"/>
-          </a:effectRef>
-          <a:fontRef idx="minor">
-            <a:schemeClr val="lt1"/>
-          </a:fontRef>
-        </p:style>
-        <p:txBody>
-          <a:bodyPr rot="0" spcFirstLastPara="0" vertOverflow="overflow" horzOverflow="overflow" vert="horz" wrap="square" lIns="96012" tIns="48007" rIns="96012" bIns="48007" numCol="1" spcCol="0" rtlCol="0" fromWordArt="0" anchor="ctr" anchorCtr="0" forceAA="0" compatLnSpc="1">
-            <a:prstTxWarp prst="textNoShape">
-              <a:avLst/>
-            </a:prstTxWarp>
-            <a:noAutofit/>
-          </a:bodyPr>
-          <a:lstStyle/>
-          <a:p>
-            <a:pPr algn="ctr"/>
-            <a:r>
-              <a:rPr lang="en-US" sz="1680">
-                <a:latin typeface="Noveo Sans" charset="0"/>
-                <a:ea typeface="Noveo Sans" charset="0"/>
-                <a:cs typeface="Noveo Sans" charset="0"/>
-              </a:rPr>
-              <a:t>Client Review</a:t>
-            </a:r>
-            <a:endParaRPr lang="en-US" sz="1680" dirty="0">
-              <a:latin typeface="Noveo Sans" charset="0"/>
-              <a:ea typeface="Noveo Sans" charset="0"/>
-              <a:cs typeface="Noveo Sans" charset="0"/>
-            </a:endParaRPr>
-          </a:p>
-        </p:txBody>
-      </p:sp>
       <p:cxnSp>
         <p:nvCxnSpPr>
           <p:cNvPr id="58" name="Straight Connector 57"/>
@@ -5655,7 +5340,7 @@
         </p:nvGraphicFramePr>
         <p:xfrm>
           <a:off x="54452" y="2158409"/>
-          <a:ext cx="1806426" cy="1623884"/>
+          <a:ext cx="1806426" cy="1805610"/>
         </p:xfrm>
         <a:graphic>
           <a:graphicData uri="http://schemas.openxmlformats.org/drawingml/2006/table">
@@ -5667,7 +5352,7 @@
                 <a:gridCol w="1806426">
                   <a:extLst>
                     <a:ext uri="{9D8B030D-6E8A-4147-A177-3AD203B41FA5}">
-                      <a16:colId xmlns:a16="http://schemas.microsoft.com/office/drawing/2014/main" val="2192527220"/>
+                      <a16:colId xmlns:a16="http://schemas.microsoft.com/office/drawing/2014/main" xmlns="" val="2192527220"/>
                     </a:ext>
                   </a:extLst>
                 </a:gridCol>
@@ -5742,7 +5427,7 @@
                 </a:tc>
                 <a:extLst>
                   <a:ext uri="{0D108BD9-81ED-4DB2-BD59-A6C34878D82A}">
-                    <a16:rowId xmlns:a16="http://schemas.microsoft.com/office/drawing/2014/main" val="1986687887"/>
+                    <a16:rowId xmlns:a16="http://schemas.microsoft.com/office/drawing/2014/main" xmlns="" val="1986687887"/>
                   </a:ext>
                 </a:extLst>
               </a:tr>
@@ -5814,7 +5499,7 @@
                 </a:tc>
                 <a:extLst>
                   <a:ext uri="{0D108BD9-81ED-4DB2-BD59-A6C34878D82A}">
-                    <a16:rowId xmlns:a16="http://schemas.microsoft.com/office/drawing/2014/main" val="3506151837"/>
+                    <a16:rowId xmlns:a16="http://schemas.microsoft.com/office/drawing/2014/main" xmlns="" val="3506151837"/>
                   </a:ext>
                 </a:extLst>
               </a:tr>
@@ -5910,7 +5595,7 @@
                 </a:tc>
                 <a:extLst>
                   <a:ext uri="{0D108BD9-81ED-4DB2-BD59-A6C34878D82A}">
-                    <a16:rowId xmlns:a16="http://schemas.microsoft.com/office/drawing/2014/main" val="1767699772"/>
+                    <a16:rowId xmlns:a16="http://schemas.microsoft.com/office/drawing/2014/main" xmlns="" val="1767699772"/>
                   </a:ext>
                 </a:extLst>
               </a:tr>
@@ -5981,7 +5666,7 @@
                 <a:gridCol w="1928341">
                   <a:extLst>
                     <a:ext uri="{9D8B030D-6E8A-4147-A177-3AD203B41FA5}">
-                      <a16:colId xmlns:a16="http://schemas.microsoft.com/office/drawing/2014/main" val="20000"/>
+                      <a16:colId xmlns:a16="http://schemas.microsoft.com/office/drawing/2014/main" xmlns="" val="20000"/>
                     </a:ext>
                   </a:extLst>
                 </a:gridCol>
@@ -6064,7 +5749,7 @@
                 </a:tc>
                 <a:extLst>
                   <a:ext uri="{0D108BD9-81ED-4DB2-BD59-A6C34878D82A}">
-                    <a16:rowId xmlns:a16="http://schemas.microsoft.com/office/drawing/2014/main" val="10000"/>
+                    <a16:rowId xmlns:a16="http://schemas.microsoft.com/office/drawing/2014/main" xmlns="" val="10000"/>
                   </a:ext>
                 </a:extLst>
               </a:tr>
@@ -6104,7 +5789,7 @@
                 </a:tc>
                 <a:extLst>
                   <a:ext uri="{0D108BD9-81ED-4DB2-BD59-A6C34878D82A}">
-                    <a16:rowId xmlns:a16="http://schemas.microsoft.com/office/drawing/2014/main" val="10001"/>
+                    <a16:rowId xmlns:a16="http://schemas.microsoft.com/office/drawing/2014/main" xmlns="" val="10001"/>
                   </a:ext>
                 </a:extLst>
               </a:tr>
@@ -6160,7 +5845,7 @@
                 </a:tc>
                 <a:extLst>
                   <a:ext uri="{0D108BD9-81ED-4DB2-BD59-A6C34878D82A}">
-                    <a16:rowId xmlns:a16="http://schemas.microsoft.com/office/drawing/2014/main" val="10002"/>
+                    <a16:rowId xmlns:a16="http://schemas.microsoft.com/office/drawing/2014/main" xmlns="" val="10002"/>
                   </a:ext>
                 </a:extLst>
               </a:tr>
@@ -6298,7 +5983,7 @@
                 </a:tc>
                 <a:extLst>
                   <a:ext uri="{0D108BD9-81ED-4DB2-BD59-A6C34878D82A}">
-                    <a16:rowId xmlns:a16="http://schemas.microsoft.com/office/drawing/2014/main" val="10003"/>
+                    <a16:rowId xmlns:a16="http://schemas.microsoft.com/office/drawing/2014/main" xmlns="" val="10003"/>
                   </a:ext>
                 </a:extLst>
               </a:tr>
@@ -6369,7 +6054,7 @@
                 <a:gridCol w="1788301">
                   <a:extLst>
                     <a:ext uri="{9D8B030D-6E8A-4147-A177-3AD203B41FA5}">
-                      <a16:colId xmlns:a16="http://schemas.microsoft.com/office/drawing/2014/main" val="2192527220"/>
+                      <a16:colId xmlns:a16="http://schemas.microsoft.com/office/drawing/2014/main" xmlns="" val="2192527220"/>
                     </a:ext>
                   </a:extLst>
                 </a:gridCol>
@@ -6460,7 +6145,7 @@
                 </a:tc>
                 <a:extLst>
                   <a:ext uri="{0D108BD9-81ED-4DB2-BD59-A6C34878D82A}">
-                    <a16:rowId xmlns:a16="http://schemas.microsoft.com/office/drawing/2014/main" val="1986687887"/>
+                    <a16:rowId xmlns:a16="http://schemas.microsoft.com/office/drawing/2014/main" xmlns="" val="1986687887"/>
                   </a:ext>
                 </a:extLst>
               </a:tr>
@@ -6516,7 +6201,7 @@
                 </a:tc>
                 <a:extLst>
                   <a:ext uri="{0D108BD9-81ED-4DB2-BD59-A6C34878D82A}">
-                    <a16:rowId xmlns:a16="http://schemas.microsoft.com/office/drawing/2014/main" val="3506151837"/>
+                    <a16:rowId xmlns:a16="http://schemas.microsoft.com/office/drawing/2014/main" xmlns="" val="3506151837"/>
                   </a:ext>
                 </a:extLst>
               </a:tr>
@@ -6654,7 +6339,7 @@
                 </a:tc>
                 <a:extLst>
                   <a:ext uri="{0D108BD9-81ED-4DB2-BD59-A6C34878D82A}">
-                    <a16:rowId xmlns:a16="http://schemas.microsoft.com/office/drawing/2014/main" val="1767699772"/>
+                    <a16:rowId xmlns:a16="http://schemas.microsoft.com/office/drawing/2014/main" xmlns="" val="1767699772"/>
                   </a:ext>
                 </a:extLst>
               </a:tr>
@@ -6725,7 +6410,7 @@
                 <a:gridCol w="1828068">
                   <a:extLst>
                     <a:ext uri="{9D8B030D-6E8A-4147-A177-3AD203B41FA5}">
-                      <a16:colId xmlns:a16="http://schemas.microsoft.com/office/drawing/2014/main" val="20000"/>
+                      <a16:colId xmlns:a16="http://schemas.microsoft.com/office/drawing/2014/main" xmlns="" val="20000"/>
                     </a:ext>
                   </a:extLst>
                 </a:gridCol>
@@ -6760,7 +6445,7 @@
                 </a:tc>
                 <a:extLst>
                   <a:ext uri="{0D108BD9-81ED-4DB2-BD59-A6C34878D82A}">
-                    <a16:rowId xmlns:a16="http://schemas.microsoft.com/office/drawing/2014/main" val="10000"/>
+                    <a16:rowId xmlns:a16="http://schemas.microsoft.com/office/drawing/2014/main" xmlns="" val="10000"/>
                   </a:ext>
                 </a:extLst>
               </a:tr>
@@ -6816,7 +6501,7 @@
                 </a:tc>
                 <a:extLst>
                   <a:ext uri="{0D108BD9-81ED-4DB2-BD59-A6C34878D82A}">
-                    <a16:rowId xmlns:a16="http://schemas.microsoft.com/office/drawing/2014/main" val="10001"/>
+                    <a16:rowId xmlns:a16="http://schemas.microsoft.com/office/drawing/2014/main" xmlns="" val="10001"/>
                   </a:ext>
                 </a:extLst>
               </a:tr>
@@ -6954,7 +6639,7 @@
                 </a:tc>
                 <a:extLst>
                   <a:ext uri="{0D108BD9-81ED-4DB2-BD59-A6C34878D82A}">
-                    <a16:rowId xmlns:a16="http://schemas.microsoft.com/office/drawing/2014/main" val="10002"/>
+                    <a16:rowId xmlns:a16="http://schemas.microsoft.com/office/drawing/2014/main" xmlns="" val="10002"/>
                   </a:ext>
                 </a:extLst>
               </a:tr>
@@ -6990,7 +6675,7 @@
                 <a:gridCol w="1806426">
                   <a:extLst>
                     <a:ext uri="{9D8B030D-6E8A-4147-A177-3AD203B41FA5}">
-                      <a16:colId xmlns:a16="http://schemas.microsoft.com/office/drawing/2014/main" val="2192527220"/>
+                      <a16:colId xmlns:a16="http://schemas.microsoft.com/office/drawing/2014/main" xmlns="" val="2192527220"/>
                     </a:ext>
                   </a:extLst>
                 </a:gridCol>
@@ -7025,7 +6710,7 @@
                 </a:tc>
                 <a:extLst>
                   <a:ext uri="{0D108BD9-81ED-4DB2-BD59-A6C34878D82A}">
-                    <a16:rowId xmlns:a16="http://schemas.microsoft.com/office/drawing/2014/main" val="1986687887"/>
+                    <a16:rowId xmlns:a16="http://schemas.microsoft.com/office/drawing/2014/main" xmlns="" val="1986687887"/>
                   </a:ext>
                 </a:extLst>
               </a:tr>
@@ -7055,11 +6740,6 @@
                         </a:rPr>
                         <a:t>Login with fingerprints</a:t>
                       </a:r>
-                      <a:endParaRPr lang="en-SG" sz="1200" dirty="0" smtClean="0">
-                        <a:latin typeface="Noveo Sans" charset="0"/>
-                        <a:ea typeface="Noveo Sans" charset="0"/>
-                        <a:cs typeface="Noveo Sans" charset="0"/>
-                      </a:endParaRPr>
                     </a:p>
                   </a:txBody>
                   <a:tcPr marL="96012" marR="96012" marT="48007" marB="48007" anchor="ctr">
@@ -7070,7 +6750,7 @@
                 </a:tc>
                 <a:extLst>
                   <a:ext uri="{0D108BD9-81ED-4DB2-BD59-A6C34878D82A}">
-                    <a16:rowId xmlns:a16="http://schemas.microsoft.com/office/drawing/2014/main" val="3506151837"/>
+                    <a16:rowId xmlns:a16="http://schemas.microsoft.com/office/drawing/2014/main" xmlns="" val="3506151837"/>
                   </a:ext>
                 </a:extLst>
               </a:tr>
@@ -7227,7 +6907,7 @@
                 </a:tc>
                 <a:extLst>
                   <a:ext uri="{0D108BD9-81ED-4DB2-BD59-A6C34878D82A}">
-                    <a16:rowId xmlns:a16="http://schemas.microsoft.com/office/drawing/2014/main" val="1767699772"/>
+                    <a16:rowId xmlns:a16="http://schemas.microsoft.com/office/drawing/2014/main" xmlns="" val="1767699772"/>
                   </a:ext>
                 </a:extLst>
               </a:tr>
@@ -7333,7 +7013,7 @@
                 <a:gridCol w="1928341">
                   <a:extLst>
                     <a:ext uri="{9D8B030D-6E8A-4147-A177-3AD203B41FA5}">
-                      <a16:colId xmlns:a16="http://schemas.microsoft.com/office/drawing/2014/main" val="20000"/>
+                      <a16:colId xmlns:a16="http://schemas.microsoft.com/office/drawing/2014/main" xmlns="" val="20000"/>
                     </a:ext>
                   </a:extLst>
                 </a:gridCol>
@@ -7368,7 +7048,7 @@
                 </a:tc>
                 <a:extLst>
                   <a:ext uri="{0D108BD9-81ED-4DB2-BD59-A6C34878D82A}">
-                    <a16:rowId xmlns:a16="http://schemas.microsoft.com/office/drawing/2014/main" val="10000"/>
+                    <a16:rowId xmlns:a16="http://schemas.microsoft.com/office/drawing/2014/main" xmlns="" val="10000"/>
                   </a:ext>
                 </a:extLst>
               </a:tr>
@@ -7402,7 +7082,7 @@
                 </a:tc>
                 <a:extLst>
                   <a:ext uri="{0D108BD9-81ED-4DB2-BD59-A6C34878D82A}">
-                    <a16:rowId xmlns:a16="http://schemas.microsoft.com/office/drawing/2014/main" val="10001"/>
+                    <a16:rowId xmlns:a16="http://schemas.microsoft.com/office/drawing/2014/main" xmlns="" val="10001"/>
                   </a:ext>
                 </a:extLst>
               </a:tr>
@@ -7448,11 +7128,6 @@
                         </a:rPr>
                         <a:t>Image Capturing</a:t>
                       </a:r>
-                      <a:endParaRPr lang="en-SG" sz="1200" dirty="0" smtClean="0">
-                        <a:latin typeface="Noveo Sans" charset="0"/>
-                        <a:ea typeface="Noveo Sans" charset="0"/>
-                        <a:cs typeface="Noveo Sans" charset="0"/>
-                      </a:endParaRPr>
                     </a:p>
                   </a:txBody>
                   <a:tcPr marL="96012" marR="96012" marT="48007" marB="48007" anchor="ctr">
@@ -7463,7 +7138,7 @@
                 </a:tc>
                 <a:extLst>
                   <a:ext uri="{0D108BD9-81ED-4DB2-BD59-A6C34878D82A}">
-                    <a16:rowId xmlns:a16="http://schemas.microsoft.com/office/drawing/2014/main" val="10002"/>
+                    <a16:rowId xmlns:a16="http://schemas.microsoft.com/office/drawing/2014/main" xmlns="" val="10002"/>
                   </a:ext>
                 </a:extLst>
               </a:tr>
@@ -7580,19 +7255,7 @@
                           <a:ea typeface="+mn-ea"/>
                           <a:cs typeface="+mn-cs"/>
                         </a:rPr>
-                        <a:t>Update Bug </a:t>
-                      </a:r>
-                      <a:r>
-                        <a:rPr lang="en-US" sz="1200" kern="1200" dirty="0" smtClean="0">
-                          <a:solidFill>
-                            <a:schemeClr val="dk1"/>
-                          </a:solidFill>
-                          <a:effectLst/>
-                          <a:latin typeface="Noveo Sans" panose="020B0503020204020203" pitchFamily="34" charset="0"/>
-                          <a:ea typeface="+mn-ea"/>
-                          <a:cs typeface="+mn-cs"/>
-                        </a:rPr>
-                        <a:t>log, Prepare acceptance slides,</a:t>
+                        <a:t>Update Bug log, Prepare acceptance slides,</a:t>
                       </a:r>
                       <a:r>
                         <a:rPr lang="en-US" sz="1200" kern="1200" baseline="0" dirty="0" smtClean="0">
@@ -7640,7 +7303,7 @@
                 </a:tc>
                 <a:extLst>
                   <a:ext uri="{0D108BD9-81ED-4DB2-BD59-A6C34878D82A}">
-                    <a16:rowId xmlns:a16="http://schemas.microsoft.com/office/drawing/2014/main" val="10003"/>
+                    <a16:rowId xmlns:a16="http://schemas.microsoft.com/office/drawing/2014/main" xmlns="" val="10003"/>
                   </a:ext>
                 </a:extLst>
               </a:tr>
@@ -7676,7 +7339,7 @@
                 <a:gridCol w="1932735">
                   <a:extLst>
                     <a:ext uri="{9D8B030D-6E8A-4147-A177-3AD203B41FA5}">
-                      <a16:colId xmlns:a16="http://schemas.microsoft.com/office/drawing/2014/main" val="2192527220"/>
+                      <a16:colId xmlns:a16="http://schemas.microsoft.com/office/drawing/2014/main" xmlns="" val="2192527220"/>
                     </a:ext>
                   </a:extLst>
                 </a:gridCol>
@@ -7727,7 +7390,7 @@
                 </a:tc>
                 <a:extLst>
                   <a:ext uri="{0D108BD9-81ED-4DB2-BD59-A6C34878D82A}">
-                    <a16:rowId xmlns:a16="http://schemas.microsoft.com/office/drawing/2014/main" val="1986687887"/>
+                    <a16:rowId xmlns:a16="http://schemas.microsoft.com/office/drawing/2014/main" xmlns="" val="1986687887"/>
                   </a:ext>
                 </a:extLst>
               </a:tr>
@@ -7757,11 +7420,6 @@
                         </a:rPr>
                         <a:t>Multiple Languages (English, Chinese and maybe Malay)</a:t>
                       </a:r>
-                      <a:endParaRPr lang="en-SG" sz="1200" dirty="0" smtClean="0">
-                        <a:latin typeface="Noveo Sans" charset="0"/>
-                        <a:ea typeface="Noveo Sans" charset="0"/>
-                        <a:cs typeface="Noveo Sans" charset="0"/>
-                      </a:endParaRPr>
                     </a:p>
                   </a:txBody>
                   <a:tcPr marL="96012" marR="96012" marT="48007" marB="48007" anchor="ctr">
@@ -7772,7 +7430,7 @@
                 </a:tc>
                 <a:extLst>
                   <a:ext uri="{0D108BD9-81ED-4DB2-BD59-A6C34878D82A}">
-                    <a16:rowId xmlns:a16="http://schemas.microsoft.com/office/drawing/2014/main" val="3506151837"/>
+                    <a16:rowId xmlns:a16="http://schemas.microsoft.com/office/drawing/2014/main" xmlns="" val="3506151837"/>
                   </a:ext>
                 </a:extLst>
               </a:tr>
@@ -7905,7 +7563,7 @@
                 </a:tc>
                 <a:extLst>
                   <a:ext uri="{0D108BD9-81ED-4DB2-BD59-A6C34878D82A}">
-                    <a16:rowId xmlns:a16="http://schemas.microsoft.com/office/drawing/2014/main" val="1767699772"/>
+                    <a16:rowId xmlns:a16="http://schemas.microsoft.com/office/drawing/2014/main" xmlns="" val="1767699772"/>
                   </a:ext>
                 </a:extLst>
               </a:tr>
@@ -7976,7 +7634,7 @@
                 <a:gridCol w="1928341">
                   <a:extLst>
                     <a:ext uri="{9D8B030D-6E8A-4147-A177-3AD203B41FA5}">
-                      <a16:colId xmlns:a16="http://schemas.microsoft.com/office/drawing/2014/main" val="20000"/>
+                      <a16:colId xmlns:a16="http://schemas.microsoft.com/office/drawing/2014/main" xmlns="" val="20000"/>
                     </a:ext>
                   </a:extLst>
                 </a:gridCol>
@@ -8027,7 +7685,7 @@
                 </a:tc>
                 <a:extLst>
                   <a:ext uri="{0D108BD9-81ED-4DB2-BD59-A6C34878D82A}">
-                    <a16:rowId xmlns:a16="http://schemas.microsoft.com/office/drawing/2014/main" val="10000"/>
+                    <a16:rowId xmlns:a16="http://schemas.microsoft.com/office/drawing/2014/main" xmlns="" val="10000"/>
                   </a:ext>
                 </a:extLst>
               </a:tr>
@@ -8078,7 +7736,7 @@
                 </a:tc>
                 <a:extLst>
                   <a:ext uri="{0D108BD9-81ED-4DB2-BD59-A6C34878D82A}">
-                    <a16:rowId xmlns:a16="http://schemas.microsoft.com/office/drawing/2014/main" val="10001"/>
+                    <a16:rowId xmlns:a16="http://schemas.microsoft.com/office/drawing/2014/main" xmlns="" val="10001"/>
                   </a:ext>
                 </a:extLst>
               </a:tr>
@@ -8108,11 +7766,6 @@
                         </a:rPr>
                         <a:t>Analytics (Analysis)</a:t>
                       </a:r>
-                      <a:endParaRPr lang="en-SG" sz="1200" dirty="0" smtClean="0">
-                        <a:latin typeface="Noveo Sans" charset="0"/>
-                        <a:ea typeface="Noveo Sans" charset="0"/>
-                        <a:cs typeface="Noveo Sans" charset="0"/>
-                      </a:endParaRPr>
                     </a:p>
                   </a:txBody>
                   <a:tcPr marL="96012" marR="96012" marT="48007" marB="48007" anchor="ctr">
@@ -8123,7 +7776,7 @@
                 </a:tc>
                 <a:extLst>
                   <a:ext uri="{0D108BD9-81ED-4DB2-BD59-A6C34878D82A}">
-                    <a16:rowId xmlns:a16="http://schemas.microsoft.com/office/drawing/2014/main" val="10002"/>
+                    <a16:rowId xmlns:a16="http://schemas.microsoft.com/office/drawing/2014/main" xmlns="" val="10002"/>
                   </a:ext>
                 </a:extLst>
               </a:tr>
@@ -8261,7 +7914,7 @@
                 </a:tc>
                 <a:extLst>
                   <a:ext uri="{0D108BD9-81ED-4DB2-BD59-A6C34878D82A}">
-                    <a16:rowId xmlns:a16="http://schemas.microsoft.com/office/drawing/2014/main" val="10003"/>
+                    <a16:rowId xmlns:a16="http://schemas.microsoft.com/office/drawing/2014/main" xmlns="" val="10003"/>
                   </a:ext>
                 </a:extLst>
               </a:tr>
@@ -8332,7 +7985,7 @@
                 <a:gridCol w="1928341">
                   <a:extLst>
                     <a:ext uri="{9D8B030D-6E8A-4147-A177-3AD203B41FA5}">
-                      <a16:colId xmlns:a16="http://schemas.microsoft.com/office/drawing/2014/main" val="20000"/>
+                      <a16:colId xmlns:a16="http://schemas.microsoft.com/office/drawing/2014/main" xmlns="" val="20000"/>
                     </a:ext>
                   </a:extLst>
                 </a:gridCol>
@@ -8367,7 +8020,7 @@
                 </a:tc>
                 <a:extLst>
                   <a:ext uri="{0D108BD9-81ED-4DB2-BD59-A6C34878D82A}">
-                    <a16:rowId xmlns:a16="http://schemas.microsoft.com/office/drawing/2014/main" val="10000"/>
+                    <a16:rowId xmlns:a16="http://schemas.microsoft.com/office/drawing/2014/main" xmlns="" val="10000"/>
                   </a:ext>
                 </a:extLst>
               </a:tr>
@@ -8401,7 +8054,7 @@
                 </a:tc>
                 <a:extLst>
                   <a:ext uri="{0D108BD9-81ED-4DB2-BD59-A6C34878D82A}">
-                    <a16:rowId xmlns:a16="http://schemas.microsoft.com/office/drawing/2014/main" val="10001"/>
+                    <a16:rowId xmlns:a16="http://schemas.microsoft.com/office/drawing/2014/main" xmlns="" val="10001"/>
                   </a:ext>
                 </a:extLst>
               </a:tr>
@@ -8431,11 +8084,6 @@
                         </a:rPr>
                         <a:t>Backend Admin Dashboard</a:t>
                       </a:r>
-                      <a:endParaRPr lang="en-SG" sz="1200" dirty="0" smtClean="0">
-                        <a:latin typeface="Noveo Sans" charset="0"/>
-                        <a:ea typeface="Noveo Sans" charset="0"/>
-                        <a:cs typeface="Noveo Sans" charset="0"/>
-                      </a:endParaRPr>
                     </a:p>
                   </a:txBody>
                   <a:tcPr marL="96012" marR="96012" marT="48007" marB="48007" anchor="ctr">
@@ -8446,7 +8094,7 @@
                 </a:tc>
                 <a:extLst>
                   <a:ext uri="{0D108BD9-81ED-4DB2-BD59-A6C34878D82A}">
-                    <a16:rowId xmlns:a16="http://schemas.microsoft.com/office/drawing/2014/main" val="10002"/>
+                    <a16:rowId xmlns:a16="http://schemas.microsoft.com/office/drawing/2014/main" xmlns="" val="10002"/>
                   </a:ext>
                 </a:extLst>
               </a:tr>
@@ -8575,7 +8223,7 @@
                 </a:tc>
                 <a:extLst>
                   <a:ext uri="{0D108BD9-81ED-4DB2-BD59-A6C34878D82A}">
-                    <a16:rowId xmlns:a16="http://schemas.microsoft.com/office/drawing/2014/main" val="10003"/>
+                    <a16:rowId xmlns:a16="http://schemas.microsoft.com/office/drawing/2014/main" xmlns="" val="10003"/>
                   </a:ext>
                 </a:extLst>
               </a:tr>
@@ -8683,7 +8331,7 @@
                 <a:gridCol w="2055072">
                   <a:extLst>
                     <a:ext uri="{9D8B030D-6E8A-4147-A177-3AD203B41FA5}">
-                      <a16:colId xmlns:a16="http://schemas.microsoft.com/office/drawing/2014/main" val="20000"/>
+                      <a16:colId xmlns:a16="http://schemas.microsoft.com/office/drawing/2014/main" xmlns="" val="20000"/>
                     </a:ext>
                   </a:extLst>
                 </a:gridCol>
@@ -8718,7 +8366,7 @@
                 </a:tc>
                 <a:extLst>
                   <a:ext uri="{0D108BD9-81ED-4DB2-BD59-A6C34878D82A}">
-                    <a16:rowId xmlns:a16="http://schemas.microsoft.com/office/drawing/2014/main" val="10000"/>
+                    <a16:rowId xmlns:a16="http://schemas.microsoft.com/office/drawing/2014/main" xmlns="" val="10000"/>
                   </a:ext>
                 </a:extLst>
               </a:tr>
@@ -8758,7 +8406,7 @@
                 </a:tc>
                 <a:extLst>
                   <a:ext uri="{0D108BD9-81ED-4DB2-BD59-A6C34878D82A}">
-                    <a16:rowId xmlns:a16="http://schemas.microsoft.com/office/drawing/2014/main" val="10001"/>
+                    <a16:rowId xmlns:a16="http://schemas.microsoft.com/office/drawing/2014/main" xmlns="" val="10001"/>
                   </a:ext>
                 </a:extLst>
               </a:tr>
@@ -8788,11 +8436,6 @@
                         </a:rPr>
                         <a:t>Push notification to remind users to record</a:t>
                       </a:r>
-                      <a:endParaRPr lang="en-SG" sz="1200" dirty="0" smtClean="0">
-                        <a:latin typeface="Noveo Sans" charset="0"/>
-                        <a:ea typeface="Noveo Sans" charset="0"/>
-                        <a:cs typeface="Noveo Sans" charset="0"/>
-                      </a:endParaRPr>
                     </a:p>
                   </a:txBody>
                   <a:tcPr marL="96012" marR="96012" marT="48007" marB="48007" anchor="ctr">
@@ -8803,7 +8446,7 @@
                 </a:tc>
                 <a:extLst>
                   <a:ext uri="{0D108BD9-81ED-4DB2-BD59-A6C34878D82A}">
-                    <a16:rowId xmlns:a16="http://schemas.microsoft.com/office/drawing/2014/main" val="10002"/>
+                    <a16:rowId xmlns:a16="http://schemas.microsoft.com/office/drawing/2014/main" xmlns="" val="10002"/>
                   </a:ext>
                 </a:extLst>
               </a:tr>
@@ -8941,7 +8584,7 @@
                 </a:tc>
                 <a:extLst>
                   <a:ext uri="{0D108BD9-81ED-4DB2-BD59-A6C34878D82A}">
-                    <a16:rowId xmlns:a16="http://schemas.microsoft.com/office/drawing/2014/main" val="10003"/>
+                    <a16:rowId xmlns:a16="http://schemas.microsoft.com/office/drawing/2014/main" xmlns="" val="10003"/>
                   </a:ext>
                 </a:extLst>
               </a:tr>
@@ -9012,7 +8655,7 @@
                 <a:gridCol w="1693067">
                   <a:extLst>
                     <a:ext uri="{9D8B030D-6E8A-4147-A177-3AD203B41FA5}">
-                      <a16:colId xmlns:a16="http://schemas.microsoft.com/office/drawing/2014/main" val="20000"/>
+                      <a16:colId xmlns:a16="http://schemas.microsoft.com/office/drawing/2014/main" xmlns="" val="20000"/>
                     </a:ext>
                   </a:extLst>
                 </a:gridCol>
@@ -9047,7 +8690,7 @@
                 </a:tc>
                 <a:extLst>
                   <a:ext uri="{0D108BD9-81ED-4DB2-BD59-A6C34878D82A}">
-                    <a16:rowId xmlns:a16="http://schemas.microsoft.com/office/drawing/2014/main" val="10000"/>
+                    <a16:rowId xmlns:a16="http://schemas.microsoft.com/office/drawing/2014/main" xmlns="" val="10000"/>
                   </a:ext>
                 </a:extLst>
               </a:tr>
@@ -9081,7 +8724,7 @@
                 </a:tc>
                 <a:extLst>
                   <a:ext uri="{0D108BD9-81ED-4DB2-BD59-A6C34878D82A}">
-                    <a16:rowId xmlns:a16="http://schemas.microsoft.com/office/drawing/2014/main" val="10001"/>
+                    <a16:rowId xmlns:a16="http://schemas.microsoft.com/office/drawing/2014/main" xmlns="" val="10001"/>
                   </a:ext>
                 </a:extLst>
               </a:tr>
@@ -9111,11 +8754,6 @@
                         </a:rPr>
                         <a:t>TBC</a:t>
                       </a:r>
-                      <a:endParaRPr lang="en-SG" sz="1200" dirty="0" smtClean="0">
-                        <a:latin typeface="Noveo Sans" charset="0"/>
-                        <a:ea typeface="Noveo Sans" charset="0"/>
-                        <a:cs typeface="Noveo Sans" charset="0"/>
-                      </a:endParaRPr>
                     </a:p>
                   </a:txBody>
                   <a:tcPr marL="96012" marR="96012" marT="48007" marB="48007" anchor="ctr">
@@ -9126,7 +8764,7 @@
                 </a:tc>
                 <a:extLst>
                   <a:ext uri="{0D108BD9-81ED-4DB2-BD59-A6C34878D82A}">
-                    <a16:rowId xmlns:a16="http://schemas.microsoft.com/office/drawing/2014/main" val="10002"/>
+                    <a16:rowId xmlns:a16="http://schemas.microsoft.com/office/drawing/2014/main" xmlns="" val="10002"/>
                   </a:ext>
                 </a:extLst>
               </a:tr>
@@ -9315,7 +8953,7 @@
                 </a:tc>
                 <a:extLst>
                   <a:ext uri="{0D108BD9-81ED-4DB2-BD59-A6C34878D82A}">
-                    <a16:rowId xmlns:a16="http://schemas.microsoft.com/office/drawing/2014/main" val="10003"/>
+                    <a16:rowId xmlns:a16="http://schemas.microsoft.com/office/drawing/2014/main" xmlns="" val="10003"/>
                   </a:ext>
                 </a:extLst>
               </a:tr>
@@ -9386,7 +9024,7 @@
                 <a:gridCol w="2055072">
                   <a:extLst>
                     <a:ext uri="{9D8B030D-6E8A-4147-A177-3AD203B41FA5}">
-                      <a16:colId xmlns:a16="http://schemas.microsoft.com/office/drawing/2014/main" val="20000"/>
+                      <a16:colId xmlns:a16="http://schemas.microsoft.com/office/drawing/2014/main" xmlns="" val="20000"/>
                     </a:ext>
                   </a:extLst>
                 </a:gridCol>
@@ -9421,7 +9059,7 @@
                 </a:tc>
                 <a:extLst>
                   <a:ext uri="{0D108BD9-81ED-4DB2-BD59-A6C34878D82A}">
-                    <a16:rowId xmlns:a16="http://schemas.microsoft.com/office/drawing/2014/main" val="10000"/>
+                    <a16:rowId xmlns:a16="http://schemas.microsoft.com/office/drawing/2014/main" xmlns="" val="10000"/>
                   </a:ext>
                 </a:extLst>
               </a:tr>
@@ -9461,7 +9099,7 @@
                 </a:tc>
                 <a:extLst>
                   <a:ext uri="{0D108BD9-81ED-4DB2-BD59-A6C34878D82A}">
-                    <a16:rowId xmlns:a16="http://schemas.microsoft.com/office/drawing/2014/main" val="10001"/>
+                    <a16:rowId xmlns:a16="http://schemas.microsoft.com/office/drawing/2014/main" xmlns="" val="10001"/>
                   </a:ext>
                 </a:extLst>
               </a:tr>
@@ -9491,11 +9129,6 @@
                         </a:rPr>
                         <a:t>TBC</a:t>
                       </a:r>
-                      <a:endParaRPr lang="en-SG" sz="1200" dirty="0" smtClean="0">
-                        <a:latin typeface="Noveo Sans" charset="0"/>
-                        <a:ea typeface="Noveo Sans" charset="0"/>
-                        <a:cs typeface="Noveo Sans" charset="0"/>
-                      </a:endParaRPr>
                     </a:p>
                   </a:txBody>
                   <a:tcPr marL="96012" marR="96012" marT="48007" marB="48007" anchor="ctr">
@@ -9506,7 +9139,7 @@
                 </a:tc>
                 <a:extLst>
                   <a:ext uri="{0D108BD9-81ED-4DB2-BD59-A6C34878D82A}">
-                    <a16:rowId xmlns:a16="http://schemas.microsoft.com/office/drawing/2014/main" val="10002"/>
+                    <a16:rowId xmlns:a16="http://schemas.microsoft.com/office/drawing/2014/main" xmlns="" val="10002"/>
                   </a:ext>
                 </a:extLst>
               </a:tr>
@@ -9623,19 +9256,7 @@
                           <a:ea typeface="+mn-ea"/>
                           <a:cs typeface="+mn-cs"/>
                         </a:rPr>
-                        <a:t>Update Bug </a:t>
-                      </a:r>
-                      <a:r>
-                        <a:rPr lang="en-US" sz="1200" kern="1200" dirty="0" smtClean="0">
-                          <a:solidFill>
-                            <a:schemeClr val="dk1"/>
-                          </a:solidFill>
-                          <a:effectLst/>
-                          <a:latin typeface="Noveo Sans" panose="020B0503020204020203" pitchFamily="34" charset="0"/>
-                          <a:ea typeface="+mn-ea"/>
-                          <a:cs typeface="+mn-cs"/>
-                        </a:rPr>
-                        <a:t>log, Prepare finals presentation</a:t>
+                        <a:t>Update Bug log, Prepare finals presentation</a:t>
                       </a:r>
                       <a:endParaRPr lang="en-SG" sz="1200" kern="1200" dirty="0">
                         <a:solidFill>
@@ -9656,7 +9277,7 @@
                 </a:tc>
                 <a:extLst>
                   <a:ext uri="{0D108BD9-81ED-4DB2-BD59-A6C34878D82A}">
-                    <a16:rowId xmlns:a16="http://schemas.microsoft.com/office/drawing/2014/main" val="10003"/>
+                    <a16:rowId xmlns:a16="http://schemas.microsoft.com/office/drawing/2014/main" xmlns="" val="10003"/>
                   </a:ext>
                 </a:extLst>
               </a:tr>
@@ -9727,7 +9348,7 @@
                 <a:gridCol w="1859779">
                   <a:extLst>
                     <a:ext uri="{9D8B030D-6E8A-4147-A177-3AD203B41FA5}">
-                      <a16:colId xmlns:a16="http://schemas.microsoft.com/office/drawing/2014/main" val="20000"/>
+                      <a16:colId xmlns:a16="http://schemas.microsoft.com/office/drawing/2014/main" xmlns="" val="20000"/>
                     </a:ext>
                   </a:extLst>
                 </a:gridCol>
@@ -9762,7 +9383,7 @@
                 </a:tc>
                 <a:extLst>
                   <a:ext uri="{0D108BD9-81ED-4DB2-BD59-A6C34878D82A}">
-                    <a16:rowId xmlns:a16="http://schemas.microsoft.com/office/drawing/2014/main" val="10000"/>
+                    <a16:rowId xmlns:a16="http://schemas.microsoft.com/office/drawing/2014/main" xmlns="" val="10000"/>
                   </a:ext>
                 </a:extLst>
               </a:tr>
@@ -9802,7 +9423,7 @@
                 </a:tc>
                 <a:extLst>
                   <a:ext uri="{0D108BD9-81ED-4DB2-BD59-A6C34878D82A}">
-                    <a16:rowId xmlns:a16="http://schemas.microsoft.com/office/drawing/2014/main" val="10001"/>
+                    <a16:rowId xmlns:a16="http://schemas.microsoft.com/office/drawing/2014/main" xmlns="" val="10001"/>
                   </a:ext>
                 </a:extLst>
               </a:tr>
@@ -9919,19 +9540,7 @@
                           <a:ea typeface="+mn-ea"/>
                           <a:cs typeface="+mn-cs"/>
                         </a:rPr>
-                        <a:t>Update Bug </a:t>
-                      </a:r>
-                      <a:r>
-                        <a:rPr lang="en-US" sz="1200" kern="1200" dirty="0" smtClean="0">
-                          <a:solidFill>
-                            <a:schemeClr val="dk1"/>
-                          </a:solidFill>
-                          <a:effectLst/>
-                          <a:latin typeface="Noveo Sans" panose="020B0503020204020203" pitchFamily="34" charset="0"/>
-                          <a:ea typeface="+mn-ea"/>
-                          <a:cs typeface="+mn-cs"/>
-                        </a:rPr>
-                        <a:t>log, </a:t>
+                        <a:t>Update Bug log, </a:t>
                       </a:r>
                       <a:r>
                         <a:rPr lang="en-SG" sz="1200" kern="1200" dirty="0" smtClean="0">
@@ -9979,7 +9588,7 @@
                 </a:tc>
                 <a:extLst>
                   <a:ext uri="{0D108BD9-81ED-4DB2-BD59-A6C34878D82A}">
-                    <a16:rowId xmlns:a16="http://schemas.microsoft.com/office/drawing/2014/main" val="10003"/>
+                    <a16:rowId xmlns:a16="http://schemas.microsoft.com/office/drawing/2014/main" xmlns="" val="10003"/>
                   </a:ext>
                 </a:extLst>
               </a:tr>
@@ -10050,7 +9659,7 @@
                 <a:gridCol w="2055072">
                   <a:extLst>
                     <a:ext uri="{9D8B030D-6E8A-4147-A177-3AD203B41FA5}">
-                      <a16:colId xmlns:a16="http://schemas.microsoft.com/office/drawing/2014/main" val="20000"/>
+                      <a16:colId xmlns:a16="http://schemas.microsoft.com/office/drawing/2014/main" xmlns="" val="20000"/>
                     </a:ext>
                   </a:extLst>
                 </a:gridCol>
@@ -10085,7 +9694,7 @@
                 </a:tc>
                 <a:extLst>
                   <a:ext uri="{0D108BD9-81ED-4DB2-BD59-A6C34878D82A}">
-                    <a16:rowId xmlns:a16="http://schemas.microsoft.com/office/drawing/2014/main" val="10000"/>
+                    <a16:rowId xmlns:a16="http://schemas.microsoft.com/office/drawing/2014/main" xmlns="" val="10000"/>
                   </a:ext>
                 </a:extLst>
               </a:tr>
@@ -10125,7 +9734,7 @@
                 </a:tc>
                 <a:extLst>
                   <a:ext uri="{0D108BD9-81ED-4DB2-BD59-A6C34878D82A}">
-                    <a16:rowId xmlns:a16="http://schemas.microsoft.com/office/drawing/2014/main" val="10001"/>
+                    <a16:rowId xmlns:a16="http://schemas.microsoft.com/office/drawing/2014/main" xmlns="" val="10001"/>
                   </a:ext>
                 </a:extLst>
               </a:tr>
@@ -10263,7 +9872,7 @@
                 </a:tc>
                 <a:extLst>
                   <a:ext uri="{0D108BD9-81ED-4DB2-BD59-A6C34878D82A}">
-                    <a16:rowId xmlns:a16="http://schemas.microsoft.com/office/drawing/2014/main" val="10003"/>
+                    <a16:rowId xmlns:a16="http://schemas.microsoft.com/office/drawing/2014/main" xmlns="" val="10003"/>
                   </a:ext>
                 </a:extLst>
               </a:tr>
@@ -10275,6 +9884,352 @@
     <p:extLst>
       <p:ext uri="{BB962C8B-B14F-4D97-AF65-F5344CB8AC3E}">
         <p14:creationId xmlns:p14="http://schemas.microsoft.com/office/powerpoint/2010/main" val="684046519"/>
+      </p:ext>
+    </p:extLst>
+  </p:cSld>
+  <p:clrMapOvr>
+    <a:masterClrMapping/>
+  </p:clrMapOvr>
+</p:sld>
+</file>
+
+<file path=ppt/slides/slide2.xml><?xml version="1.0" encoding="utf-8"?>
+<p:sld xmlns:a="http://schemas.openxmlformats.org/drawingml/2006/main" xmlns:r="http://schemas.openxmlformats.org/officeDocument/2006/relationships" xmlns:p="http://schemas.openxmlformats.org/presentationml/2006/main">
+  <p:cSld>
+    <p:spTree>
+      <p:nvGrpSpPr>
+        <p:cNvPr id="1" name=""/>
+        <p:cNvGrpSpPr/>
+        <p:nvPr/>
+      </p:nvGrpSpPr>
+      <p:grpSpPr>
+        <a:xfrm>
+          <a:off x="0" y="0"/>
+          <a:ext cx="0" cy="0"/>
+          <a:chOff x="0" y="0"/>
+          <a:chExt cx="0" cy="0"/>
+        </a:xfrm>
+      </p:grpSpPr>
+      <p:sp>
+        <p:nvSpPr>
+          <p:cNvPr id="9" name="Rectangle 8"/>
+          <p:cNvSpPr/>
+          <p:nvPr/>
+        </p:nvSpPr>
+        <p:spPr>
+          <a:xfrm>
+            <a:off x="4256324" y="4280461"/>
+            <a:ext cx="1806426" cy="1542553"/>
+          </a:xfrm>
+          <a:prstGeom prst="rect">
+            <a:avLst/>
+          </a:prstGeom>
+          <a:solidFill>
+            <a:srgbClr val="E7E7E7"/>
+          </a:solidFill>
+          <a:ln>
+            <a:solidFill>
+              <a:schemeClr val="accent6">
+                <a:lumMod val="50000"/>
+              </a:schemeClr>
+            </a:solidFill>
+          </a:ln>
+        </p:spPr>
+        <p:style>
+          <a:lnRef idx="2">
+            <a:schemeClr val="accent1">
+              <a:shade val="50000"/>
+            </a:schemeClr>
+          </a:lnRef>
+          <a:fillRef idx="1">
+            <a:schemeClr val="accent1"/>
+          </a:fillRef>
+          <a:effectRef idx="0">
+            <a:schemeClr val="accent1"/>
+          </a:effectRef>
+          <a:fontRef idx="minor">
+            <a:schemeClr val="lt1"/>
+          </a:fontRef>
+        </p:style>
+        <p:txBody>
+          <a:bodyPr rtlCol="0" anchor="ctr"/>
+          <a:lstStyle/>
+          <a:p>
+            <a:pPr algn="ctr"/>
+            <a:endParaRPr lang="en-SG"/>
+          </a:p>
+        </p:txBody>
+      </p:sp>
+      <p:sp>
+        <p:nvSpPr>
+          <p:cNvPr id="10" name="Oval 9"/>
+          <p:cNvSpPr/>
+          <p:nvPr/>
+        </p:nvSpPr>
+        <p:spPr>
+          <a:xfrm>
+            <a:off x="4337611" y="4399686"/>
+            <a:ext cx="270614" cy="268395"/>
+          </a:xfrm>
+          <a:prstGeom prst="ellipse">
+            <a:avLst/>
+          </a:prstGeom>
+          <a:solidFill>
+            <a:srgbClr val="BDC3C7"/>
+          </a:solidFill>
+          <a:ln>
+            <a:solidFill>
+              <a:schemeClr val="bg2">
+                <a:lumMod val="75000"/>
+              </a:schemeClr>
+            </a:solidFill>
+          </a:ln>
+        </p:spPr>
+        <p:style>
+          <a:lnRef idx="2">
+            <a:schemeClr val="accent1">
+              <a:shade val="50000"/>
+            </a:schemeClr>
+          </a:lnRef>
+          <a:fillRef idx="1">
+            <a:schemeClr val="accent1"/>
+          </a:fillRef>
+          <a:effectRef idx="0">
+            <a:schemeClr val="accent1"/>
+          </a:effectRef>
+          <a:fontRef idx="minor">
+            <a:schemeClr val="lt1"/>
+          </a:fontRef>
+        </p:style>
+        <p:txBody>
+          <a:bodyPr rtlCol="0" anchor="ctr"/>
+          <a:lstStyle/>
+          <a:p>
+            <a:pPr algn="ctr"/>
+            <a:endParaRPr lang="en-US" sz="1471" dirty="0">
+              <a:latin typeface="Noveo Sans" charset="0"/>
+              <a:ea typeface="Noveo Sans" charset="0"/>
+              <a:cs typeface="Noveo Sans" charset="0"/>
+            </a:endParaRPr>
+          </a:p>
+        </p:txBody>
+      </p:sp>
+      <p:sp>
+        <p:nvSpPr>
+          <p:cNvPr id="11" name="TextBox 10"/>
+          <p:cNvSpPr txBox="1"/>
+          <p:nvPr/>
+        </p:nvSpPr>
+        <p:spPr>
+          <a:xfrm>
+            <a:off x="4578575" y="4392234"/>
+            <a:ext cx="2136001" cy="286232"/>
+          </a:xfrm>
+          <a:prstGeom prst="rect">
+            <a:avLst/>
+          </a:prstGeom>
+          <a:noFill/>
+        </p:spPr>
+        <p:txBody>
+          <a:bodyPr wrap="square" rtlCol="0">
+            <a:spAutoFit/>
+          </a:bodyPr>
+          <a:lstStyle/>
+          <a:p>
+            <a:r>
+              <a:rPr lang="en-US" sz="1260" dirty="0">
+                <a:latin typeface="Noveo Sans" charset="0"/>
+                <a:ea typeface="Noveo Sans" charset="0"/>
+                <a:cs typeface="Noveo Sans" charset="0"/>
+              </a:rPr>
+              <a:t>= Iteration Number</a:t>
+            </a:r>
+          </a:p>
+        </p:txBody>
+      </p:sp>
+      <p:sp>
+        <p:nvSpPr>
+          <p:cNvPr id="12" name="Rectangle 11"/>
+          <p:cNvSpPr/>
+          <p:nvPr/>
+        </p:nvSpPr>
+        <p:spPr>
+          <a:xfrm>
+            <a:off x="4337610" y="4703758"/>
+            <a:ext cx="1190833" cy="211687"/>
+          </a:xfrm>
+          <a:prstGeom prst="rect">
+            <a:avLst/>
+          </a:prstGeom>
+          <a:solidFill>
+            <a:srgbClr val="FDB813"/>
+          </a:solidFill>
+          <a:ln>
+            <a:noFill/>
+          </a:ln>
+        </p:spPr>
+        <p:style>
+          <a:lnRef idx="2">
+            <a:schemeClr val="accent1">
+              <a:shade val="50000"/>
+            </a:schemeClr>
+          </a:lnRef>
+          <a:fillRef idx="1">
+            <a:schemeClr val="accent1"/>
+          </a:fillRef>
+          <a:effectRef idx="0">
+            <a:schemeClr val="accent1"/>
+          </a:effectRef>
+          <a:fontRef idx="minor">
+            <a:schemeClr val="lt1"/>
+          </a:fontRef>
+        </p:style>
+        <p:txBody>
+          <a:bodyPr rot="0" spcFirstLastPara="0" vertOverflow="overflow" horzOverflow="overflow" vert="horz" wrap="square" lIns="96012" tIns="48007" rIns="96012" bIns="48007" numCol="1" spcCol="0" rtlCol="0" fromWordArt="0" anchor="ctr" anchorCtr="0" forceAA="0" compatLnSpc="1">
+            <a:prstTxWarp prst="textNoShape">
+              <a:avLst/>
+            </a:prstTxWarp>
+            <a:noAutofit/>
+          </a:bodyPr>
+          <a:lstStyle/>
+          <a:p>
+            <a:pPr algn="ctr"/>
+            <a:r>
+              <a:rPr lang="en-US" sz="1680" dirty="0">
+                <a:latin typeface="Noveo Sans" charset="0"/>
+                <a:ea typeface="Noveo Sans" charset="0"/>
+                <a:cs typeface="Noveo Sans" charset="0"/>
+              </a:rPr>
+              <a:t>User Test</a:t>
+            </a:r>
+          </a:p>
+        </p:txBody>
+      </p:sp>
+      <p:sp>
+        <p:nvSpPr>
+          <p:cNvPr id="13" name="Rectangle 12"/>
+          <p:cNvSpPr/>
+          <p:nvPr/>
+        </p:nvSpPr>
+        <p:spPr>
+          <a:xfrm>
+            <a:off x="4337611" y="4950804"/>
+            <a:ext cx="1190833" cy="237239"/>
+          </a:xfrm>
+          <a:prstGeom prst="rect">
+            <a:avLst/>
+          </a:prstGeom>
+          <a:solidFill>
+            <a:srgbClr val="DE1A54"/>
+          </a:solidFill>
+          <a:ln>
+            <a:noFill/>
+          </a:ln>
+        </p:spPr>
+        <p:style>
+          <a:lnRef idx="2">
+            <a:schemeClr val="accent1">
+              <a:shade val="50000"/>
+            </a:schemeClr>
+          </a:lnRef>
+          <a:fillRef idx="1">
+            <a:schemeClr val="accent1"/>
+          </a:fillRef>
+          <a:effectRef idx="0">
+            <a:schemeClr val="accent1"/>
+          </a:effectRef>
+          <a:fontRef idx="minor">
+            <a:schemeClr val="lt1"/>
+          </a:fontRef>
+        </p:style>
+        <p:txBody>
+          <a:bodyPr rot="0" spcFirstLastPara="0" vertOverflow="overflow" horzOverflow="overflow" vert="horz" wrap="square" lIns="96012" tIns="48007" rIns="96012" bIns="48007" numCol="1" spcCol="0" rtlCol="0" fromWordArt="0" anchor="ctr" anchorCtr="0" forceAA="0" compatLnSpc="1">
+            <a:prstTxWarp prst="textNoShape">
+              <a:avLst/>
+            </a:prstTxWarp>
+            <a:noAutofit/>
+          </a:bodyPr>
+          <a:lstStyle/>
+          <a:p>
+            <a:pPr algn="ctr"/>
+            <a:r>
+              <a:rPr lang="en-US" sz="1680" dirty="0">
+                <a:latin typeface="Noveo Sans" charset="0"/>
+                <a:ea typeface="Noveo Sans" charset="0"/>
+                <a:cs typeface="Noveo Sans" charset="0"/>
+              </a:rPr>
+              <a:t>Milestones</a:t>
+            </a:r>
+          </a:p>
+        </p:txBody>
+      </p:sp>
+      <p:sp>
+        <p:nvSpPr>
+          <p:cNvPr id="14" name="Rectangle 13"/>
+          <p:cNvSpPr/>
+          <p:nvPr/>
+        </p:nvSpPr>
+        <p:spPr>
+          <a:xfrm>
+            <a:off x="4337611" y="5237374"/>
+            <a:ext cx="1190833" cy="489739"/>
+          </a:xfrm>
+          <a:prstGeom prst="rect">
+            <a:avLst/>
+          </a:prstGeom>
+          <a:solidFill>
+            <a:srgbClr val="0068B3"/>
+          </a:solidFill>
+          <a:ln>
+            <a:noFill/>
+          </a:ln>
+        </p:spPr>
+        <p:style>
+          <a:lnRef idx="2">
+            <a:schemeClr val="accent1">
+              <a:shade val="50000"/>
+            </a:schemeClr>
+          </a:lnRef>
+          <a:fillRef idx="1">
+            <a:schemeClr val="accent1"/>
+          </a:fillRef>
+          <a:effectRef idx="0">
+            <a:schemeClr val="accent1"/>
+          </a:effectRef>
+          <a:fontRef idx="minor">
+            <a:schemeClr val="lt1"/>
+          </a:fontRef>
+        </p:style>
+        <p:txBody>
+          <a:bodyPr rot="0" spcFirstLastPara="0" vertOverflow="overflow" horzOverflow="overflow" vert="horz" wrap="square" lIns="96012" tIns="48007" rIns="96012" bIns="48007" numCol="1" spcCol="0" rtlCol="0" fromWordArt="0" anchor="ctr" anchorCtr="0" forceAA="0" compatLnSpc="1">
+            <a:prstTxWarp prst="textNoShape">
+              <a:avLst/>
+            </a:prstTxWarp>
+            <a:noAutofit/>
+          </a:bodyPr>
+          <a:lstStyle/>
+          <a:p>
+            <a:pPr algn="ctr"/>
+            <a:r>
+              <a:rPr lang="en-US" sz="1680">
+                <a:latin typeface="Noveo Sans" charset="0"/>
+                <a:ea typeface="Noveo Sans" charset="0"/>
+                <a:cs typeface="Noveo Sans" charset="0"/>
+              </a:rPr>
+              <a:t>Client Review</a:t>
+            </a:r>
+            <a:endParaRPr lang="en-US" sz="1680" dirty="0">
+              <a:latin typeface="Noveo Sans" charset="0"/>
+              <a:ea typeface="Noveo Sans" charset="0"/>
+              <a:cs typeface="Noveo Sans" charset="0"/>
+            </a:endParaRPr>
+          </a:p>
+        </p:txBody>
+      </p:sp>
+    </p:spTree>
+    <p:extLst>
+      <p:ext uri="{BB962C8B-B14F-4D97-AF65-F5344CB8AC3E}">
+        <p14:creationId xmlns:p14="http://schemas.microsoft.com/office/powerpoint/2010/main" val="1045577408"/>
       </p:ext>
     </p:extLst>
   </p:cSld>

</xml_diff>